<commit_message>
Initial roadmap document update
Update of copyright footer and functional diagram
</commit_message>
<xml_diff>
--- a/roadmap-docs/CoMPAS Initial Roadmap - final version.pptx
+++ b/roadmap-docs/CoMPAS Initial Roadmap - final version.pptx
@@ -197,14 +197,6 @@
 </p:cmAuthorLst>
 </file>
 
-<file path=ppt/revisionInfo.xml><?xml version="1.0" encoding="utf-8"?>
-<p1510:revInfo xmlns:a="http://schemas.openxmlformats.org/drawingml/2006/main" xmlns:r="http://schemas.openxmlformats.org/officeDocument/2006/relationships" xmlns:p1510="http://schemas.microsoft.com/office/powerpoint/2015/10/main">
-  <p1510:revLst>
-    <p1510:client id="{7428EFC0-D923-AF6E-1DB1-415E67E51D97}" v="6" dt="2020-04-17T12:37:55.182"/>
-  </p1510:revLst>
-</p1510:revInfo>
-</file>
-
 <file path=ppt/changesInfos/changesInfo1.xml><?xml version="1.0" encoding="utf-8"?>
 <pc:chgInfo xmlns:a="http://schemas.openxmlformats.org/drawingml/2006/main" xmlns:r="http://schemas.openxmlformats.org/officeDocument/2006/relationships" xmlns:ac="http://schemas.microsoft.com/office/drawing/2013/main/command" xmlns:pc="http://schemas.microsoft.com/office/powerpoint/2013/main/command">
   <pc:docChgLst>
@@ -234,7 +226,7 @@
   <pc:docChgLst>
     <pc:chgData name="BALEA Lucian" userId="822c887d-be06-4a8d-a50b-40fe1f7b3153" providerId="ADAL" clId="{38DB6AE1-748C-49C0-B932-B132EFDCD387}"/>
     <pc:docChg chg="undo custSel modSld">
-      <pc:chgData name="BALEA Lucian" userId="822c887d-be06-4a8d-a50b-40fe1f7b3153" providerId="ADAL" clId="{38DB6AE1-748C-49C0-B932-B132EFDCD387}" dt="2020-04-17T16:32:07.124" v="134" actId="6549"/>
+      <pc:chgData name="BALEA Lucian" userId="822c887d-be06-4a8d-a50b-40fe1f7b3153" providerId="ADAL" clId="{38DB6AE1-748C-49C0-B932-B132EFDCD387}" dt="2020-04-22T11:27:56.786" v="168" actId="14100"/>
       <pc:docMkLst>
         <pc:docMk/>
       </pc:docMkLst>
@@ -254,7 +246,7 @@
         </pc:spChg>
       </pc:sldChg>
       <pc:sldChg chg="modSp delCm modCm">
-        <pc:chgData name="BALEA Lucian" userId="822c887d-be06-4a8d-a50b-40fe1f7b3153" providerId="ADAL" clId="{38DB6AE1-748C-49C0-B932-B132EFDCD387}" dt="2020-04-17T15:52:43.893" v="116"/>
+        <pc:chgData name="BALEA Lucian" userId="822c887d-be06-4a8d-a50b-40fe1f7b3153" providerId="ADAL" clId="{38DB6AE1-748C-49C0-B932-B132EFDCD387}" dt="2020-04-21T17:07:38.705" v="153"/>
         <pc:sldMkLst>
           <pc:docMk/>
           <pc:sldMk cId="3399242811" sldId="265"/>
@@ -268,7 +260,7 @@
           </ac:spMkLst>
         </pc:spChg>
         <pc:spChg chg="mod">
-          <ac:chgData name="BALEA Lucian" userId="822c887d-be06-4a8d-a50b-40fe1f7b3153" providerId="ADAL" clId="{38DB6AE1-748C-49C0-B932-B132EFDCD387}" dt="2020-04-17T15:52:43.893" v="116"/>
+          <ac:chgData name="BALEA Lucian" userId="822c887d-be06-4a8d-a50b-40fe1f7b3153" providerId="ADAL" clId="{38DB6AE1-748C-49C0-B932-B132EFDCD387}" dt="2020-04-21T17:07:38.705" v="153"/>
           <ac:spMkLst>
             <pc:docMk/>
             <pc:sldMk cId="3399242811" sldId="265"/>
@@ -277,7 +269,7 @@
         </pc:spChg>
       </pc:sldChg>
       <pc:sldChg chg="modSp">
-        <pc:chgData name="BALEA Lucian" userId="822c887d-be06-4a8d-a50b-40fe1f7b3153" providerId="ADAL" clId="{38DB6AE1-748C-49C0-B932-B132EFDCD387}" dt="2020-04-17T15:56:00.890" v="128" actId="207"/>
+        <pc:chgData name="BALEA Lucian" userId="822c887d-be06-4a8d-a50b-40fe1f7b3153" providerId="ADAL" clId="{38DB6AE1-748C-49C0-B932-B132EFDCD387}" dt="2020-04-21T17:08:17.008" v="159"/>
         <pc:sldMkLst>
           <pc:docMk/>
           <pc:sldMk cId="584027107" sldId="267"/>
@@ -291,7 +283,7 @@
           </ac:spMkLst>
         </pc:spChg>
         <pc:spChg chg="mod">
-          <ac:chgData name="BALEA Lucian" userId="822c887d-be06-4a8d-a50b-40fe1f7b3153" providerId="ADAL" clId="{38DB6AE1-748C-49C0-B932-B132EFDCD387}" dt="2020-04-17T15:55:41.897" v="125"/>
+          <ac:chgData name="BALEA Lucian" userId="822c887d-be06-4a8d-a50b-40fe1f7b3153" providerId="ADAL" clId="{38DB6AE1-748C-49C0-B932-B132EFDCD387}" dt="2020-04-21T17:08:17.008" v="159"/>
           <ac:spMkLst>
             <pc:docMk/>
             <pc:sldMk cId="584027107" sldId="267"/>
@@ -300,13 +292,13 @@
         </pc:spChg>
       </pc:sldChg>
       <pc:sldChg chg="modSp">
-        <pc:chgData name="BALEA Lucian" userId="822c887d-be06-4a8d-a50b-40fe1f7b3153" providerId="ADAL" clId="{38DB6AE1-748C-49C0-B932-B132EFDCD387}" dt="2020-04-17T15:57:11.152" v="133" actId="207"/>
+        <pc:chgData name="BALEA Lucian" userId="822c887d-be06-4a8d-a50b-40fe1f7b3153" providerId="ADAL" clId="{38DB6AE1-748C-49C0-B932-B132EFDCD387}" dt="2020-04-21T17:08:53.969" v="163"/>
         <pc:sldMkLst>
           <pc:docMk/>
           <pc:sldMk cId="2058667316" sldId="268"/>
         </pc:sldMkLst>
         <pc:spChg chg="mod">
-          <ac:chgData name="BALEA Lucian" userId="822c887d-be06-4a8d-a50b-40fe1f7b3153" providerId="ADAL" clId="{38DB6AE1-748C-49C0-B932-B132EFDCD387}" dt="2020-04-17T15:57:03.101" v="131"/>
+          <ac:chgData name="BALEA Lucian" userId="822c887d-be06-4a8d-a50b-40fe1f7b3153" providerId="ADAL" clId="{38DB6AE1-748C-49C0-B932-B132EFDCD387}" dt="2020-04-21T17:08:53.969" v="163"/>
           <ac:spMkLst>
             <pc:docMk/>
             <pc:sldMk cId="2058667316" sldId="268"/>
@@ -323,13 +315,13 @@
         </pc:graphicFrameChg>
       </pc:sldChg>
       <pc:sldChg chg="modSp">
-        <pc:chgData name="BALEA Lucian" userId="822c887d-be06-4a8d-a50b-40fe1f7b3153" providerId="ADAL" clId="{38DB6AE1-748C-49C0-B932-B132EFDCD387}" dt="2020-04-17T15:52:47.573" v="117"/>
+        <pc:chgData name="BALEA Lucian" userId="822c887d-be06-4a8d-a50b-40fe1f7b3153" providerId="ADAL" clId="{38DB6AE1-748C-49C0-B932-B132EFDCD387}" dt="2020-04-21T17:07:46.718" v="154"/>
         <pc:sldMkLst>
           <pc:docMk/>
           <pc:sldMk cId="3104466916" sldId="274"/>
         </pc:sldMkLst>
         <pc:spChg chg="mod">
-          <ac:chgData name="BALEA Lucian" userId="822c887d-be06-4a8d-a50b-40fe1f7b3153" providerId="ADAL" clId="{38DB6AE1-748C-49C0-B932-B132EFDCD387}" dt="2020-04-17T15:52:47.573" v="117"/>
+          <ac:chgData name="BALEA Lucian" userId="822c887d-be06-4a8d-a50b-40fe1f7b3153" providerId="ADAL" clId="{38DB6AE1-748C-49C0-B932-B132EFDCD387}" dt="2020-04-21T17:07:46.718" v="154"/>
           <ac:spMkLst>
             <pc:docMk/>
             <pc:sldMk cId="3104466916" sldId="274"/>
@@ -338,13 +330,13 @@
         </pc:spChg>
       </pc:sldChg>
       <pc:sldChg chg="modSp">
-        <pc:chgData name="BALEA Lucian" userId="822c887d-be06-4a8d-a50b-40fe1f7b3153" providerId="ADAL" clId="{38DB6AE1-748C-49C0-B932-B132EFDCD387}" dt="2020-04-17T15:50:35.025" v="75" actId="108"/>
+        <pc:chgData name="BALEA Lucian" userId="822c887d-be06-4a8d-a50b-40fe1f7b3153" providerId="ADAL" clId="{38DB6AE1-748C-49C0-B932-B132EFDCD387}" dt="2020-04-21T17:06:38.828" v="151" actId="6549"/>
         <pc:sldMkLst>
           <pc:docMk/>
           <pc:sldMk cId="3393978816" sldId="278"/>
         </pc:sldMkLst>
         <pc:spChg chg="mod">
-          <ac:chgData name="BALEA Lucian" userId="822c887d-be06-4a8d-a50b-40fe1f7b3153" providerId="ADAL" clId="{38DB6AE1-748C-49C0-B932-B132EFDCD387}" dt="2020-04-17T15:50:35.025" v="75" actId="108"/>
+          <ac:chgData name="BALEA Lucian" userId="822c887d-be06-4a8d-a50b-40fe1f7b3153" providerId="ADAL" clId="{38DB6AE1-748C-49C0-B932-B132EFDCD387}" dt="2020-04-21T17:06:38.828" v="151" actId="6549"/>
           <ac:spMkLst>
             <pc:docMk/>
             <pc:sldMk cId="3393978816" sldId="278"/>
@@ -353,7 +345,7 @@
         </pc:spChg>
       </pc:sldChg>
       <pc:sldChg chg="modSp delCm">
-        <pc:chgData name="BALEA Lucian" userId="822c887d-be06-4a8d-a50b-40fe1f7b3153" providerId="ADAL" clId="{38DB6AE1-748C-49C0-B932-B132EFDCD387}" dt="2020-04-17T15:53:40.146" v="121" actId="207"/>
+        <pc:chgData name="BALEA Lucian" userId="822c887d-be06-4a8d-a50b-40fe1f7b3153" providerId="ADAL" clId="{38DB6AE1-748C-49C0-B932-B132EFDCD387}" dt="2020-04-21T17:07:58.543" v="156"/>
         <pc:sldMkLst>
           <pc:docMk/>
           <pc:sldMk cId="2696020928" sldId="279"/>
@@ -367,7 +359,7 @@
           </ac:spMkLst>
         </pc:spChg>
         <pc:spChg chg="mod">
-          <ac:chgData name="BALEA Lucian" userId="822c887d-be06-4a8d-a50b-40fe1f7b3153" providerId="ADAL" clId="{38DB6AE1-748C-49C0-B932-B132EFDCD387}" dt="2020-04-17T15:53:30.320" v="119"/>
+          <ac:chgData name="BALEA Lucian" userId="822c887d-be06-4a8d-a50b-40fe1f7b3153" providerId="ADAL" clId="{38DB6AE1-748C-49C0-B932-B132EFDCD387}" dt="2020-04-21T17:07:58.543" v="156"/>
           <ac:spMkLst>
             <pc:docMk/>
             <pc:sldMk cId="2696020928" sldId="279"/>
@@ -376,7 +368,7 @@
         </pc:spChg>
       </pc:sldChg>
       <pc:sldChg chg="modSp delCm">
-        <pc:chgData name="BALEA Lucian" userId="822c887d-be06-4a8d-a50b-40fe1f7b3153" providerId="ADAL" clId="{38DB6AE1-748C-49C0-B932-B132EFDCD387}" dt="2020-04-17T15:52:52.078" v="118"/>
+        <pc:chgData name="BALEA Lucian" userId="822c887d-be06-4a8d-a50b-40fe1f7b3153" providerId="ADAL" clId="{38DB6AE1-748C-49C0-B932-B132EFDCD387}" dt="2020-04-21T17:07:52.751" v="155"/>
         <pc:sldMkLst>
           <pc:docMk/>
           <pc:sldMk cId="2044902663" sldId="280"/>
@@ -390,7 +382,7 @@
           </ac:spMkLst>
         </pc:spChg>
         <pc:spChg chg="mod">
-          <ac:chgData name="BALEA Lucian" userId="822c887d-be06-4a8d-a50b-40fe1f7b3153" providerId="ADAL" clId="{38DB6AE1-748C-49C0-B932-B132EFDCD387}" dt="2020-04-17T15:52:52.078" v="118"/>
+          <ac:chgData name="BALEA Lucian" userId="822c887d-be06-4a8d-a50b-40fe1f7b3153" providerId="ADAL" clId="{38DB6AE1-748C-49C0-B932-B132EFDCD387}" dt="2020-04-21T17:07:52.751" v="155"/>
           <ac:spMkLst>
             <pc:docMk/>
             <pc:sldMk cId="2044902663" sldId="280"/>
@@ -398,29 +390,45 @@
           </ac:spMkLst>
         </pc:spChg>
       </pc:sldChg>
-      <pc:sldChg chg="modSp">
-        <pc:chgData name="BALEA Lucian" userId="822c887d-be06-4a8d-a50b-40fe1f7b3153" providerId="ADAL" clId="{38DB6AE1-748C-49C0-B932-B132EFDCD387}" dt="2020-04-17T15:55:13.033" v="122"/>
+      <pc:sldChg chg="addSp delSp modSp">
+        <pc:chgData name="BALEA Lucian" userId="822c887d-be06-4a8d-a50b-40fe1f7b3153" providerId="ADAL" clId="{38DB6AE1-748C-49C0-B932-B132EFDCD387}" dt="2020-04-22T11:27:56.786" v="168" actId="14100"/>
         <pc:sldMkLst>
           <pc:docMk/>
           <pc:sldMk cId="2524288378" sldId="712"/>
         </pc:sldMkLst>
         <pc:spChg chg="mod">
-          <ac:chgData name="BALEA Lucian" userId="822c887d-be06-4a8d-a50b-40fe1f7b3153" providerId="ADAL" clId="{38DB6AE1-748C-49C0-B932-B132EFDCD387}" dt="2020-04-17T15:55:13.033" v="122"/>
+          <ac:chgData name="BALEA Lucian" userId="822c887d-be06-4a8d-a50b-40fe1f7b3153" providerId="ADAL" clId="{38DB6AE1-748C-49C0-B932-B132EFDCD387}" dt="2020-04-21T17:08:05.720" v="157"/>
           <ac:spMkLst>
             <pc:docMk/>
             <pc:sldMk cId="2524288378" sldId="712"/>
             <ac:spMk id="5" creationId="{8FA4FC23-2566-4B49-ADC2-6004F80F81F9}"/>
           </ac:spMkLst>
         </pc:spChg>
+        <pc:picChg chg="del">
+          <ac:chgData name="BALEA Lucian" userId="822c887d-be06-4a8d-a50b-40fe1f7b3153" providerId="ADAL" clId="{38DB6AE1-748C-49C0-B932-B132EFDCD387}" dt="2020-04-22T11:25:59.866" v="164" actId="478"/>
+          <ac:picMkLst>
+            <pc:docMk/>
+            <pc:sldMk cId="2524288378" sldId="712"/>
+            <ac:picMk id="3" creationId="{0C532466-10BA-4B3C-B7F5-A49864D29804}"/>
+          </ac:picMkLst>
+        </pc:picChg>
+        <pc:picChg chg="add mod">
+          <ac:chgData name="BALEA Lucian" userId="822c887d-be06-4a8d-a50b-40fe1f7b3153" providerId="ADAL" clId="{38DB6AE1-748C-49C0-B932-B132EFDCD387}" dt="2020-04-22T11:27:56.786" v="168" actId="14100"/>
+          <ac:picMkLst>
+            <pc:docMk/>
+            <pc:sldMk cId="2524288378" sldId="712"/>
+            <ac:picMk id="6" creationId="{D019CC9B-3558-403A-A3D8-07D6437ECA3B}"/>
+          </ac:picMkLst>
+        </pc:picChg>
       </pc:sldChg>
       <pc:sldChg chg="modSp">
-        <pc:chgData name="BALEA Lucian" userId="822c887d-be06-4a8d-a50b-40fe1f7b3153" providerId="ADAL" clId="{38DB6AE1-748C-49C0-B932-B132EFDCD387}" dt="2020-04-17T15:55:19.663" v="123"/>
+        <pc:chgData name="BALEA Lucian" userId="822c887d-be06-4a8d-a50b-40fe1f7b3153" providerId="ADAL" clId="{38DB6AE1-748C-49C0-B932-B132EFDCD387}" dt="2020-04-21T17:08:11.536" v="158"/>
         <pc:sldMkLst>
           <pc:docMk/>
           <pc:sldMk cId="3993735029" sldId="713"/>
         </pc:sldMkLst>
         <pc:spChg chg="mod">
-          <ac:chgData name="BALEA Lucian" userId="822c887d-be06-4a8d-a50b-40fe1f7b3153" providerId="ADAL" clId="{38DB6AE1-748C-49C0-B932-B132EFDCD387}" dt="2020-04-17T15:55:19.663" v="123"/>
+          <ac:chgData name="BALEA Lucian" userId="822c887d-be06-4a8d-a50b-40fe1f7b3153" providerId="ADAL" clId="{38DB6AE1-748C-49C0-B932-B132EFDCD387}" dt="2020-04-21T17:08:11.536" v="158"/>
           <ac:spMkLst>
             <pc:docMk/>
             <pc:sldMk cId="3993735029" sldId="713"/>
@@ -429,13 +437,13 @@
         </pc:spChg>
       </pc:sldChg>
       <pc:sldChg chg="modSp">
-        <pc:chgData name="BALEA Lucian" userId="822c887d-be06-4a8d-a50b-40fe1f7b3153" providerId="ADAL" clId="{38DB6AE1-748C-49C0-B932-B132EFDCD387}" dt="2020-04-17T15:56:19.240" v="129"/>
+        <pc:chgData name="BALEA Lucian" userId="822c887d-be06-4a8d-a50b-40fe1f7b3153" providerId="ADAL" clId="{38DB6AE1-748C-49C0-B932-B132EFDCD387}" dt="2020-04-21T17:08:36.456" v="161"/>
         <pc:sldMkLst>
           <pc:docMk/>
           <pc:sldMk cId="3015039079" sldId="715"/>
         </pc:sldMkLst>
         <pc:spChg chg="mod">
-          <ac:chgData name="BALEA Lucian" userId="822c887d-be06-4a8d-a50b-40fe1f7b3153" providerId="ADAL" clId="{38DB6AE1-748C-49C0-B932-B132EFDCD387}" dt="2020-04-17T15:56:19.240" v="129"/>
+          <ac:chgData name="BALEA Lucian" userId="822c887d-be06-4a8d-a50b-40fe1f7b3153" providerId="ADAL" clId="{38DB6AE1-748C-49C0-B932-B132EFDCD387}" dt="2020-04-21T17:08:36.456" v="161"/>
           <ac:spMkLst>
             <pc:docMk/>
             <pc:sldMk cId="3015039079" sldId="715"/>
@@ -444,13 +452,13 @@
         </pc:spChg>
       </pc:sldChg>
       <pc:sldChg chg="modSp">
-        <pc:chgData name="BALEA Lucian" userId="822c887d-be06-4a8d-a50b-40fe1f7b3153" providerId="ADAL" clId="{38DB6AE1-748C-49C0-B932-B132EFDCD387}" dt="2020-04-17T15:55:51.918" v="127" actId="207"/>
+        <pc:chgData name="BALEA Lucian" userId="822c887d-be06-4a8d-a50b-40fe1f7b3153" providerId="ADAL" clId="{38DB6AE1-748C-49C0-B932-B132EFDCD387}" dt="2020-04-21T17:08:28.018" v="160"/>
         <pc:sldMkLst>
           <pc:docMk/>
           <pc:sldMk cId="1187960173" sldId="716"/>
         </pc:sldMkLst>
         <pc:spChg chg="mod">
-          <ac:chgData name="BALEA Lucian" userId="822c887d-be06-4a8d-a50b-40fe1f7b3153" providerId="ADAL" clId="{38DB6AE1-748C-49C0-B932-B132EFDCD387}" dt="2020-04-17T15:55:46.510" v="126"/>
+          <ac:chgData name="BALEA Lucian" userId="822c887d-be06-4a8d-a50b-40fe1f7b3153" providerId="ADAL" clId="{38DB6AE1-748C-49C0-B932-B132EFDCD387}" dt="2020-04-21T17:08:28.018" v="160"/>
           <ac:spMkLst>
             <pc:docMk/>
             <pc:sldMk cId="1187960173" sldId="716"/>
@@ -467,13 +475,13 @@
         </pc:spChg>
       </pc:sldChg>
       <pc:sldChg chg="modSp">
-        <pc:chgData name="BALEA Lucian" userId="822c887d-be06-4a8d-a50b-40fe1f7b3153" providerId="ADAL" clId="{38DB6AE1-748C-49C0-B932-B132EFDCD387}" dt="2020-04-17T15:56:57.083" v="130"/>
+        <pc:chgData name="BALEA Lucian" userId="822c887d-be06-4a8d-a50b-40fe1f7b3153" providerId="ADAL" clId="{38DB6AE1-748C-49C0-B932-B132EFDCD387}" dt="2020-04-21T17:08:42.655" v="162"/>
         <pc:sldMkLst>
           <pc:docMk/>
           <pc:sldMk cId="1646194306" sldId="718"/>
         </pc:sldMkLst>
         <pc:spChg chg="mod">
-          <ac:chgData name="BALEA Lucian" userId="822c887d-be06-4a8d-a50b-40fe1f7b3153" providerId="ADAL" clId="{38DB6AE1-748C-49C0-B932-B132EFDCD387}" dt="2020-04-17T15:56:57.083" v="130"/>
+          <ac:chgData name="BALEA Lucian" userId="822c887d-be06-4a8d-a50b-40fe1f7b3153" providerId="ADAL" clId="{38DB6AE1-748C-49C0-B932-B132EFDCD387}" dt="2020-04-21T17:08:42.655" v="162"/>
           <ac:spMkLst>
             <pc:docMk/>
             <pc:sldMk cId="1646194306" sldId="718"/>
@@ -7754,7 +7762,7 @@
             </a:r>
             <a:r>
               <a:rPr lang="en-US" kern="0" dirty="0"/>
-              <a:t>, GE, RTE, Schneider Electric, </a:t>
+              <a:t>, GE, National Grid, RTE, Schneider Electric, </a:t>
             </a:r>
             <a:r>
               <a:rPr lang="en-US" kern="0" dirty="0" err="1"/>
@@ -8139,7 +8147,7 @@
             </a:r>
             <a:r>
               <a:rPr lang="en-US" kern="0" dirty="0"/>
-              <a:t>, GE, RTE, Schneider Electric, </a:t>
+              <a:t>, GE, National Grid, RTE, Schneider Electric, </a:t>
             </a:r>
             <a:r>
               <a:rPr lang="en-US" kern="0" dirty="0" err="1"/>
@@ -10363,7 +10371,7 @@
             </a:r>
             <a:r>
               <a:rPr lang="en-US" kern="0" dirty="0"/>
-              <a:t>, GE, RTE, Schneider Electric, </a:t>
+              <a:t>, GE, National Grid, RTE, Schneider Electric, </a:t>
             </a:r>
             <a:r>
               <a:rPr lang="en-US" kern="0" dirty="0" err="1"/>
@@ -11795,7 +11803,7 @@
             </a:r>
             <a:r>
               <a:rPr lang="en-US" kern="0" dirty="0"/>
-              <a:t>, GE, RTE, Schneider Electric, </a:t>
+              <a:t>, GE, National Grid, RTE, Schneider Electric, </a:t>
             </a:r>
             <a:r>
               <a:rPr lang="en-US" kern="0" dirty="0" err="1"/>
@@ -13120,7 +13128,7 @@
             </a:r>
             <a:r>
               <a:rPr lang="en-US" kern="0" dirty="0"/>
-              <a:t>, GE, RTE, Schneider Electric, </a:t>
+              <a:t>, GE, National Grid, RTE, Schneider Electric, </a:t>
             </a:r>
             <a:r>
               <a:rPr lang="en-US" kern="0" dirty="0" err="1"/>
@@ -14082,7 +14090,7 @@
             </a:r>
             <a:r>
               <a:rPr lang="en-US" kern="0" dirty="0"/>
-              <a:t>, GE, RTE, Schneider Electric, </a:t>
+              <a:t>, GE, National Grid, RTE, Schneider Electric, </a:t>
             </a:r>
             <a:r>
               <a:rPr lang="en-US" kern="0" dirty="0" err="1"/>
@@ -14357,7 +14365,7 @@
             </a:r>
             <a:r>
               <a:rPr lang="en-US" kern="0" dirty="0"/>
-              <a:t>, GE, RTE, Schneider Electric, </a:t>
+              <a:t>, GE, National Grid, RTE, Schneider Electric, </a:t>
             </a:r>
             <a:r>
               <a:rPr lang="en-US" kern="0" dirty="0" err="1"/>
@@ -14670,7 +14678,7 @@
             </a:r>
             <a:r>
               <a:rPr lang="en-US" kern="0" dirty="0"/>
-              <a:t>, GE, RTE, Schneider Electric, </a:t>
+              <a:t>, GE, National Grid, RTE, Schneider Electric, </a:t>
             </a:r>
             <a:r>
               <a:rPr lang="en-US" kern="0" dirty="0" err="1"/>
@@ -14940,7 +14948,7 @@
             </a:r>
             <a:r>
               <a:rPr lang="en-US" kern="0" dirty="0"/>
-              <a:t>, GE, RTE, Schneider Electric, </a:t>
+              <a:t>, GE, National Grid, RTE, Schneider Electric, </a:t>
             </a:r>
             <a:r>
               <a:rPr lang="en-US" kern="0" dirty="0" err="1"/>
@@ -15267,7 +15275,7 @@
             </a:r>
             <a:r>
               <a:rPr lang="en-US" kern="0" dirty="0"/>
-              <a:t>, GE, RTE, Schneider Electric, </a:t>
+              <a:t>, GE, National Grid, RTE, Schneider Electric, </a:t>
             </a:r>
             <a:r>
               <a:rPr lang="en-US" kern="0" dirty="0" err="1"/>
@@ -15537,7 +15545,7 @@
             </a:r>
             <a:r>
               <a:rPr lang="en-US" kern="0" dirty="0"/>
-              <a:t>, GE, RTE, Schneider Electric, </a:t>
+              <a:t>, GE, National Grid, RTE, Schneider Electric, </a:t>
             </a:r>
             <a:r>
               <a:rPr lang="en-US" kern="0" dirty="0" err="1"/>
@@ -15633,35 +15641,6 @@
           </a:p>
         </p:txBody>
       </p:sp>
-      <p:pic>
-        <p:nvPicPr>
-          <p:cNvPr id="3" name="Image 2" descr="Une image contenant texte, carte&#10;&#10;Description générée automatiquement">
-            <a:extLst>
-              <a:ext uri="{FF2B5EF4-FFF2-40B4-BE49-F238E27FC236}">
-                <a16:creationId xmlns:a16="http://schemas.microsoft.com/office/drawing/2014/main" id="{0C532466-10BA-4B3C-B7F5-A49864D29804}"/>
-              </a:ext>
-            </a:extLst>
-          </p:cNvPr>
-          <p:cNvPicPr>
-            <a:picLocks noChangeAspect="1"/>
-          </p:cNvPicPr>
-          <p:nvPr/>
-        </p:nvPicPr>
-        <p:blipFill rotWithShape="1">
-          <a:blip r:embed="rId2"/>
-          <a:srcRect r="3559"/>
-          <a:stretch/>
-        </p:blipFill>
-        <p:spPr>
-          <a:xfrm>
-            <a:off x="1177008" y="393961"/>
-            <a:ext cx="6506422" cy="4355578"/>
-          </a:xfrm>
-          <a:prstGeom prst="rect">
-            <a:avLst/>
-          </a:prstGeom>
-        </p:spPr>
-      </p:pic>
       <p:sp>
         <p:nvSpPr>
           <p:cNvPr id="5" name="Espace réservé du pied de page 1">
@@ -15698,7 +15677,7 @@
             </a:r>
             <a:r>
               <a:rPr lang="en-US" kern="0" dirty="0"/>
-              <a:t>, GE, RTE, Schneider Electric, </a:t>
+              <a:t>, GE, National Grid, RTE, Schneider Electric, </a:t>
             </a:r>
             <a:r>
               <a:rPr lang="en-US" kern="0" dirty="0" err="1"/>
@@ -15718,6 +15697,36 @@
           </a:p>
         </p:txBody>
       </p:sp>
+      <p:pic>
+        <p:nvPicPr>
+          <p:cNvPr id="6" name="Image 5" descr="Une image contenant texte, carte&#10;&#10;Description générée automatiquement">
+            <a:extLst>
+              <a:ext uri="{FF2B5EF4-FFF2-40B4-BE49-F238E27FC236}">
+                <a16:creationId xmlns:a16="http://schemas.microsoft.com/office/drawing/2014/main" id="{D019CC9B-3558-403A-A3D8-07D6437ECA3B}"/>
+              </a:ext>
+            </a:extLst>
+          </p:cNvPr>
+          <p:cNvPicPr>
+            <a:picLocks noChangeAspect="1"/>
+          </p:cNvPicPr>
+          <p:nvPr/>
+        </p:nvPicPr>
+        <p:blipFill>
+          <a:blip r:embed="rId2"/>
+          <a:stretch>
+            <a:fillRect/>
+          </a:stretch>
+        </p:blipFill>
+        <p:spPr>
+          <a:xfrm>
+            <a:off x="1409075" y="475637"/>
+            <a:ext cx="6325850" cy="4192226"/>
+          </a:xfrm>
+          <a:prstGeom prst="rect">
+            <a:avLst/>
+          </a:prstGeom>
+        </p:spPr>
+      </p:pic>
     </p:spTree>
     <p:extLst>
       <p:ext uri="{BB962C8B-B14F-4D97-AF65-F5344CB8AC3E}">
@@ -16553,16 +16562,16 @@
 <file path=customXml/itemProps2.xml><?xml version="1.0" encoding="utf-8"?>
 <ds:datastoreItem xmlns:ds="http://schemas.openxmlformats.org/officeDocument/2006/customXml" ds:itemID="{FA141814-2E17-43BE-825B-E6FF967D2C19}">
   <ds:schemaRefs>
+    <ds:schemaRef ds:uri="http://purl.org/dc/elements/1.1/"/>
     <ds:schemaRef ds:uri="http://purl.org/dc/terms/"/>
     <ds:schemaRef ds:uri="http://schemas.microsoft.com/office/2006/metadata/properties"/>
-    <ds:schemaRef ds:uri="http://purl.org/dc/elements/1.1/"/>
+    <ds:schemaRef ds:uri="http://schemas.microsoft.com/office/infopath/2007/PartnerControls"/>
+    <ds:schemaRef ds:uri="http://schemas.microsoft.com/office/2006/documentManagement/types"/>
+    <ds:schemaRef ds:uri="http://www.w3.org/XML/1998/namespace"/>
+    <ds:schemaRef ds:uri="http://schemas.openxmlformats.org/package/2006/metadata/core-properties"/>
+    <ds:schemaRef ds:uri="e7eebcba-988e-498c-899d-a3b4259f0312"/>
     <ds:schemaRef ds:uri="093020be-362e-427e-bcba-5bfc522db69b"/>
-    <ds:schemaRef ds:uri="http://schemas.microsoft.com/office/2006/documentManagement/types"/>
-    <ds:schemaRef ds:uri="http://schemas.openxmlformats.org/package/2006/metadata/core-properties"/>
     <ds:schemaRef ds:uri="http://purl.org/dc/dcmitype/"/>
-    <ds:schemaRef ds:uri="http://schemas.microsoft.com/office/infopath/2007/PartnerControls"/>
-    <ds:schemaRef ds:uri="e7eebcba-988e-498c-899d-a3b4259f0312"/>
-    <ds:schemaRef ds:uri="http://www.w3.org/XML/1998/namespace"/>
   </ds:schemaRefs>
 </ds:datastoreItem>
 </file>

</xml_diff>

<commit_message>
Update initial roadmap document
Signed-off-by: Lucian Balea <lucian.balea@rte-france.com>
</commit_message>
<xml_diff>
--- a/roadmap-docs/CoMPAS Initial Roadmap - final version.pptx
+++ b/roadmap-docs/CoMPAS Initial Roadmap - final version.pptx
@@ -200,6 +200,180 @@
 <file path=ppt/changesInfos/changesInfo1.xml><?xml version="1.0" encoding="utf-8"?>
 <pc:chgInfo xmlns:a="http://schemas.openxmlformats.org/drawingml/2006/main" xmlns:r="http://schemas.openxmlformats.org/officeDocument/2006/relationships" xmlns:ac="http://schemas.microsoft.com/office/drawing/2013/main/command" xmlns:pc="http://schemas.microsoft.com/office/powerpoint/2013/main/command">
   <pc:docChgLst>
+    <pc:chgData name="Lucian BALEA" userId="822c887d-be06-4a8d-a50b-40fe1f7b3153" providerId="ADAL" clId="{38DB6AE1-748C-49C0-B932-B132EFDCD387}"/>
+    <pc:docChg chg="modSld">
+      <pc:chgData name="Lucian BALEA" userId="822c887d-be06-4a8d-a50b-40fe1f7b3153" providerId="ADAL" clId="{38DB6AE1-748C-49C0-B932-B132EFDCD387}" dt="2020-05-14T06:34:34.001" v="10"/>
+      <pc:docMkLst>
+        <pc:docMk/>
+      </pc:docMkLst>
+      <pc:sldChg chg="modSp">
+        <pc:chgData name="Lucian BALEA" userId="822c887d-be06-4a8d-a50b-40fe1f7b3153" providerId="ADAL" clId="{38DB6AE1-748C-49C0-B932-B132EFDCD387}" dt="2020-05-14T06:32:55.886" v="0"/>
+        <pc:sldMkLst>
+          <pc:docMk/>
+          <pc:sldMk cId="3399242811" sldId="265"/>
+        </pc:sldMkLst>
+        <pc:spChg chg="mod">
+          <ac:chgData name="Lucian BALEA" userId="822c887d-be06-4a8d-a50b-40fe1f7b3153" providerId="ADAL" clId="{38DB6AE1-748C-49C0-B932-B132EFDCD387}" dt="2020-05-14T06:32:55.886" v="0"/>
+          <ac:spMkLst>
+            <pc:docMk/>
+            <pc:sldMk cId="3399242811" sldId="265"/>
+            <ac:spMk id="7" creationId="{9E86342D-69D1-44EC-A249-9F8EA0E85D2E}"/>
+          </ac:spMkLst>
+        </pc:spChg>
+      </pc:sldChg>
+      <pc:sldChg chg="modSp">
+        <pc:chgData name="Lucian BALEA" userId="822c887d-be06-4a8d-a50b-40fe1f7b3153" providerId="ADAL" clId="{38DB6AE1-748C-49C0-B932-B132EFDCD387}" dt="2020-05-14T06:34:04.746" v="6"/>
+        <pc:sldMkLst>
+          <pc:docMk/>
+          <pc:sldMk cId="584027107" sldId="267"/>
+        </pc:sldMkLst>
+        <pc:spChg chg="mod">
+          <ac:chgData name="Lucian BALEA" userId="822c887d-be06-4a8d-a50b-40fe1f7b3153" providerId="ADAL" clId="{38DB6AE1-748C-49C0-B932-B132EFDCD387}" dt="2020-05-14T06:34:04.746" v="6"/>
+          <ac:spMkLst>
+            <pc:docMk/>
+            <pc:sldMk cId="584027107" sldId="267"/>
+            <ac:spMk id="6" creationId="{4839B247-DBB5-44F8-BF2C-70C644D811EB}"/>
+          </ac:spMkLst>
+        </pc:spChg>
+      </pc:sldChg>
+      <pc:sldChg chg="modSp">
+        <pc:chgData name="Lucian BALEA" userId="822c887d-be06-4a8d-a50b-40fe1f7b3153" providerId="ADAL" clId="{38DB6AE1-748C-49C0-B932-B132EFDCD387}" dt="2020-05-14T06:34:34.001" v="10"/>
+        <pc:sldMkLst>
+          <pc:docMk/>
+          <pc:sldMk cId="2058667316" sldId="268"/>
+        </pc:sldMkLst>
+        <pc:spChg chg="mod">
+          <ac:chgData name="Lucian BALEA" userId="822c887d-be06-4a8d-a50b-40fe1f7b3153" providerId="ADAL" clId="{38DB6AE1-748C-49C0-B932-B132EFDCD387}" dt="2020-05-14T06:34:34.001" v="10"/>
+          <ac:spMkLst>
+            <pc:docMk/>
+            <pc:sldMk cId="2058667316" sldId="268"/>
+            <ac:spMk id="5" creationId="{0DE9C1C7-EF3C-477C-94AC-E740D292F7F9}"/>
+          </ac:spMkLst>
+        </pc:spChg>
+      </pc:sldChg>
+      <pc:sldChg chg="modSp">
+        <pc:chgData name="Lucian BALEA" userId="822c887d-be06-4a8d-a50b-40fe1f7b3153" providerId="ADAL" clId="{38DB6AE1-748C-49C0-B932-B132EFDCD387}" dt="2020-05-14T06:33:02.407" v="1"/>
+        <pc:sldMkLst>
+          <pc:docMk/>
+          <pc:sldMk cId="3104466916" sldId="274"/>
+        </pc:sldMkLst>
+        <pc:spChg chg="mod">
+          <ac:chgData name="Lucian BALEA" userId="822c887d-be06-4a8d-a50b-40fe1f7b3153" providerId="ADAL" clId="{38DB6AE1-748C-49C0-B932-B132EFDCD387}" dt="2020-05-14T06:33:02.407" v="1"/>
+          <ac:spMkLst>
+            <pc:docMk/>
+            <pc:sldMk cId="3104466916" sldId="274"/>
+            <ac:spMk id="6" creationId="{85D969C6-63F7-446A-B778-7A62C21F04EB}"/>
+          </ac:spMkLst>
+        </pc:spChg>
+      </pc:sldChg>
+      <pc:sldChg chg="modSp">
+        <pc:chgData name="Lucian BALEA" userId="822c887d-be06-4a8d-a50b-40fe1f7b3153" providerId="ADAL" clId="{38DB6AE1-748C-49C0-B932-B132EFDCD387}" dt="2020-05-14T06:33:39.103" v="3"/>
+        <pc:sldMkLst>
+          <pc:docMk/>
+          <pc:sldMk cId="2696020928" sldId="279"/>
+        </pc:sldMkLst>
+        <pc:spChg chg="mod">
+          <ac:chgData name="Lucian BALEA" userId="822c887d-be06-4a8d-a50b-40fe1f7b3153" providerId="ADAL" clId="{38DB6AE1-748C-49C0-B932-B132EFDCD387}" dt="2020-05-14T06:33:39.103" v="3"/>
+          <ac:spMkLst>
+            <pc:docMk/>
+            <pc:sldMk cId="2696020928" sldId="279"/>
+            <ac:spMk id="6" creationId="{A8461830-98BD-4314-BB32-607BA6709049}"/>
+          </ac:spMkLst>
+        </pc:spChg>
+      </pc:sldChg>
+      <pc:sldChg chg="modSp">
+        <pc:chgData name="Lucian BALEA" userId="822c887d-be06-4a8d-a50b-40fe1f7b3153" providerId="ADAL" clId="{38DB6AE1-748C-49C0-B932-B132EFDCD387}" dt="2020-05-14T06:33:33.189" v="2"/>
+        <pc:sldMkLst>
+          <pc:docMk/>
+          <pc:sldMk cId="2044902663" sldId="280"/>
+        </pc:sldMkLst>
+        <pc:spChg chg="mod">
+          <ac:chgData name="Lucian BALEA" userId="822c887d-be06-4a8d-a50b-40fe1f7b3153" providerId="ADAL" clId="{38DB6AE1-748C-49C0-B932-B132EFDCD387}" dt="2020-05-14T06:33:33.189" v="2"/>
+          <ac:spMkLst>
+            <pc:docMk/>
+            <pc:sldMk cId="2044902663" sldId="280"/>
+            <ac:spMk id="6" creationId="{B0C20A7B-0EC0-4EF6-87B1-95C15883B826}"/>
+          </ac:spMkLst>
+        </pc:spChg>
+      </pc:sldChg>
+      <pc:sldChg chg="modSp">
+        <pc:chgData name="Lucian BALEA" userId="822c887d-be06-4a8d-a50b-40fe1f7b3153" providerId="ADAL" clId="{38DB6AE1-748C-49C0-B932-B132EFDCD387}" dt="2020-05-14T06:33:44.045" v="4"/>
+        <pc:sldMkLst>
+          <pc:docMk/>
+          <pc:sldMk cId="2524288378" sldId="712"/>
+        </pc:sldMkLst>
+        <pc:spChg chg="mod">
+          <ac:chgData name="Lucian BALEA" userId="822c887d-be06-4a8d-a50b-40fe1f7b3153" providerId="ADAL" clId="{38DB6AE1-748C-49C0-B932-B132EFDCD387}" dt="2020-05-14T06:33:44.045" v="4"/>
+          <ac:spMkLst>
+            <pc:docMk/>
+            <pc:sldMk cId="2524288378" sldId="712"/>
+            <ac:spMk id="5" creationId="{8FA4FC23-2566-4B49-ADC2-6004F80F81F9}"/>
+          </ac:spMkLst>
+        </pc:spChg>
+      </pc:sldChg>
+      <pc:sldChg chg="modSp">
+        <pc:chgData name="Lucian BALEA" userId="822c887d-be06-4a8d-a50b-40fe1f7b3153" providerId="ADAL" clId="{38DB6AE1-748C-49C0-B932-B132EFDCD387}" dt="2020-05-14T06:33:50.433" v="5"/>
+        <pc:sldMkLst>
+          <pc:docMk/>
+          <pc:sldMk cId="3993735029" sldId="713"/>
+        </pc:sldMkLst>
+        <pc:spChg chg="mod">
+          <ac:chgData name="Lucian BALEA" userId="822c887d-be06-4a8d-a50b-40fe1f7b3153" providerId="ADAL" clId="{38DB6AE1-748C-49C0-B932-B132EFDCD387}" dt="2020-05-14T06:33:50.433" v="5"/>
+          <ac:spMkLst>
+            <pc:docMk/>
+            <pc:sldMk cId="3993735029" sldId="713"/>
+            <ac:spMk id="6" creationId="{07B1E2FC-20FE-4807-A27E-AAFDA93FE38B}"/>
+          </ac:spMkLst>
+        </pc:spChg>
+      </pc:sldChg>
+      <pc:sldChg chg="modSp">
+        <pc:chgData name="Lucian BALEA" userId="822c887d-be06-4a8d-a50b-40fe1f7b3153" providerId="ADAL" clId="{38DB6AE1-748C-49C0-B932-B132EFDCD387}" dt="2020-05-14T06:34:12.655" v="8"/>
+        <pc:sldMkLst>
+          <pc:docMk/>
+          <pc:sldMk cId="3015039079" sldId="715"/>
+        </pc:sldMkLst>
+        <pc:spChg chg="mod">
+          <ac:chgData name="Lucian BALEA" userId="822c887d-be06-4a8d-a50b-40fe1f7b3153" providerId="ADAL" clId="{38DB6AE1-748C-49C0-B932-B132EFDCD387}" dt="2020-05-14T06:34:12.655" v="8"/>
+          <ac:spMkLst>
+            <pc:docMk/>
+            <pc:sldMk cId="3015039079" sldId="715"/>
+            <ac:spMk id="28" creationId="{17C80B4E-74F0-4FAF-BBD2-2AC2D3C4E349}"/>
+          </ac:spMkLst>
+        </pc:spChg>
+      </pc:sldChg>
+      <pc:sldChg chg="modSp">
+        <pc:chgData name="Lucian BALEA" userId="822c887d-be06-4a8d-a50b-40fe1f7b3153" providerId="ADAL" clId="{38DB6AE1-748C-49C0-B932-B132EFDCD387}" dt="2020-05-14T06:34:08.775" v="7"/>
+        <pc:sldMkLst>
+          <pc:docMk/>
+          <pc:sldMk cId="1187960173" sldId="716"/>
+        </pc:sldMkLst>
+        <pc:spChg chg="mod">
+          <ac:chgData name="Lucian BALEA" userId="822c887d-be06-4a8d-a50b-40fe1f7b3153" providerId="ADAL" clId="{38DB6AE1-748C-49C0-B932-B132EFDCD387}" dt="2020-05-14T06:34:08.775" v="7"/>
+          <ac:spMkLst>
+            <pc:docMk/>
+            <pc:sldMk cId="1187960173" sldId="716"/>
+            <ac:spMk id="53" creationId="{32DB34A0-1519-4DBF-BDC2-0BE7D7070A56}"/>
+          </ac:spMkLst>
+        </pc:spChg>
+      </pc:sldChg>
+      <pc:sldChg chg="modSp">
+        <pc:chgData name="Lucian BALEA" userId="822c887d-be06-4a8d-a50b-40fe1f7b3153" providerId="ADAL" clId="{38DB6AE1-748C-49C0-B932-B132EFDCD387}" dt="2020-05-14T06:34:24.761" v="9"/>
+        <pc:sldMkLst>
+          <pc:docMk/>
+          <pc:sldMk cId="1646194306" sldId="718"/>
+        </pc:sldMkLst>
+        <pc:spChg chg="mod">
+          <ac:chgData name="Lucian BALEA" userId="822c887d-be06-4a8d-a50b-40fe1f7b3153" providerId="ADAL" clId="{38DB6AE1-748C-49C0-B932-B132EFDCD387}" dt="2020-05-14T06:34:24.761" v="9"/>
+          <ac:spMkLst>
+            <pc:docMk/>
+            <pc:sldMk cId="1646194306" sldId="718"/>
+            <ac:spMk id="29" creationId="{DF46FDC1-D4FE-4C52-A26A-4C9EE1B5B9E6}"/>
+          </ac:spMkLst>
+        </pc:spChg>
+      </pc:sldChg>
+    </pc:docChg>
+  </pc:docChgLst>
+  <pc:docChgLst>
     <pc:chgData name="BALEA Lucian" userId="822c887d-be06-4a8d-a50b-40fe1f7b3153" providerId="ADAL" clId="{39ED151F-DCC2-4EC8-BC90-CDDDB40D2FF1}"/>
     <pc:docChg chg="undo custSel modSld">
       <pc:chgData name="BALEA Lucian" userId="822c887d-be06-4a8d-a50b-40fe1f7b3153" providerId="ADAL" clId="{39ED151F-DCC2-4EC8-BC90-CDDDB40D2FF1}" dt="2020-04-17T15:44:07.118" v="4" actId="207"/>
@@ -226,7 +400,7 @@
   <pc:docChgLst>
     <pc:chgData name="BALEA Lucian" userId="822c887d-be06-4a8d-a50b-40fe1f7b3153" providerId="ADAL" clId="{38DB6AE1-748C-49C0-B932-B132EFDCD387}"/>
     <pc:docChg chg="undo custSel modSld">
-      <pc:chgData name="BALEA Lucian" userId="822c887d-be06-4a8d-a50b-40fe1f7b3153" providerId="ADAL" clId="{38DB6AE1-748C-49C0-B932-B132EFDCD387}" dt="2020-04-22T11:27:56.786" v="168" actId="14100"/>
+      <pc:chgData name="BALEA Lucian" userId="822c887d-be06-4a8d-a50b-40fe1f7b3153" providerId="ADAL" clId="{38DB6AE1-748C-49C0-B932-B132EFDCD387}" dt="2020-05-04T11:56:14.064" v="201" actId="6549"/>
       <pc:docMkLst>
         <pc:docMk/>
       </pc:docMkLst>
@@ -269,13 +443,13 @@
         </pc:spChg>
       </pc:sldChg>
       <pc:sldChg chg="modSp">
-        <pc:chgData name="BALEA Lucian" userId="822c887d-be06-4a8d-a50b-40fe1f7b3153" providerId="ADAL" clId="{38DB6AE1-748C-49C0-B932-B132EFDCD387}" dt="2020-04-21T17:08:17.008" v="159"/>
+        <pc:chgData name="BALEA Lucian" userId="822c887d-be06-4a8d-a50b-40fe1f7b3153" providerId="ADAL" clId="{38DB6AE1-748C-49C0-B932-B132EFDCD387}" dt="2020-05-04T11:56:14.064" v="201" actId="6549"/>
         <pc:sldMkLst>
           <pc:docMk/>
           <pc:sldMk cId="584027107" sldId="267"/>
         </pc:sldMkLst>
         <pc:spChg chg="mod">
-          <ac:chgData name="BALEA Lucian" userId="822c887d-be06-4a8d-a50b-40fe1f7b3153" providerId="ADAL" clId="{38DB6AE1-748C-49C0-B932-B132EFDCD387}" dt="2020-04-17T15:56:00.890" v="128" actId="207"/>
+          <ac:chgData name="BALEA Lucian" userId="822c887d-be06-4a8d-a50b-40fe1f7b3153" providerId="ADAL" clId="{38DB6AE1-748C-49C0-B932-B132EFDCD387}" dt="2020-05-04T11:56:14.064" v="201" actId="6549"/>
           <ac:spMkLst>
             <pc:docMk/>
             <pc:sldMk cId="584027107" sldId="267"/>
@@ -452,11 +626,27 @@
         </pc:spChg>
       </pc:sldChg>
       <pc:sldChg chg="modSp">
-        <pc:chgData name="BALEA Lucian" userId="822c887d-be06-4a8d-a50b-40fe1f7b3153" providerId="ADAL" clId="{38DB6AE1-748C-49C0-B932-B132EFDCD387}" dt="2020-04-21T17:08:28.018" v="160"/>
+        <pc:chgData name="BALEA Lucian" userId="822c887d-be06-4a8d-a50b-40fe1f7b3153" providerId="ADAL" clId="{38DB6AE1-748C-49C0-B932-B132EFDCD387}" dt="2020-04-27T15:34:50.678" v="196" actId="6549"/>
         <pc:sldMkLst>
           <pc:docMk/>
           <pc:sldMk cId="1187960173" sldId="716"/>
         </pc:sldMkLst>
+        <pc:spChg chg="mod">
+          <ac:chgData name="BALEA Lucian" userId="822c887d-be06-4a8d-a50b-40fe1f7b3153" providerId="ADAL" clId="{38DB6AE1-748C-49C0-B932-B132EFDCD387}" dt="2020-04-27T15:34:50.678" v="196" actId="6549"/>
+          <ac:spMkLst>
+            <pc:docMk/>
+            <pc:sldMk cId="1187960173" sldId="716"/>
+            <ac:spMk id="23" creationId="{00000000-0000-0000-0000-000000000000}"/>
+          </ac:spMkLst>
+        </pc:spChg>
+        <pc:spChg chg="mod">
+          <ac:chgData name="BALEA Lucian" userId="822c887d-be06-4a8d-a50b-40fe1f7b3153" providerId="ADAL" clId="{38DB6AE1-748C-49C0-B932-B132EFDCD387}" dt="2020-04-27T15:34:16.229" v="179" actId="20577"/>
+          <ac:spMkLst>
+            <pc:docMk/>
+            <pc:sldMk cId="1187960173" sldId="716"/>
+            <ac:spMk id="52" creationId="{00000000-0000-0000-0000-000000000000}"/>
+          </ac:spMkLst>
+        </pc:spChg>
         <pc:spChg chg="mod">
           <ac:chgData name="BALEA Lucian" userId="822c887d-be06-4a8d-a50b-40fe1f7b3153" providerId="ADAL" clId="{38DB6AE1-748C-49C0-B932-B132EFDCD387}" dt="2020-04-21T17:08:28.018" v="160"/>
           <ac:spMkLst>
@@ -7762,7 +7952,15 @@
             </a:r>
             <a:r>
               <a:rPr lang="en-US" kern="0" dirty="0"/>
-              <a:t>, GE, National Grid, RTE, Schneider Electric, </a:t>
+              <a:t>, GE, National Grid, </a:t>
+            </a:r>
+            <a:r>
+              <a:rPr lang="en-US" kern="0" dirty="0" err="1"/>
+              <a:t>OSIsoft</a:t>
+            </a:r>
+            <a:r>
+              <a:rPr lang="en-US" kern="0" dirty="0"/>
+              <a:t>, RTE, Schneider Electric, </a:t>
             </a:r>
             <a:r>
               <a:rPr lang="en-US" kern="0" dirty="0" err="1"/>
@@ -8068,8 +8266,21 @@
                   <a:schemeClr val="tx1"/>
                 </a:solidFill>
               </a:rPr>
-              <a:t>to enable the customization/automatization of the configuration process according to specificities of the users</a:t>
-            </a:r>
+              <a:t>to enable the customization/automatization of the configuration process according to the specificities </a:t>
+            </a:r>
+            <a:r>
+              <a:rPr lang="en-US" sz="1600">
+                <a:solidFill>
+                  <a:schemeClr val="tx1"/>
+                </a:solidFill>
+              </a:rPr>
+              <a:t>of users</a:t>
+            </a:r>
+            <a:endParaRPr lang="en-US" sz="1600" dirty="0">
+              <a:solidFill>
+                <a:schemeClr val="tx1"/>
+              </a:solidFill>
+            </a:endParaRPr>
           </a:p>
           <a:p>
             <a:pPr marL="456565" indent="-405765">
@@ -8147,7 +8358,15 @@
             </a:r>
             <a:r>
               <a:rPr lang="en-US" kern="0" dirty="0"/>
-              <a:t>, GE, National Grid, RTE, Schneider Electric, </a:t>
+              <a:t>, GE, National Grid, </a:t>
+            </a:r>
+            <a:r>
+              <a:rPr lang="en-US" kern="0" dirty="0" err="1"/>
+              <a:t>OSIsoft</a:t>
+            </a:r>
+            <a:r>
+              <a:rPr lang="en-US" kern="0" dirty="0"/>
+              <a:t>, RTE, Schneider Electric, </a:t>
             </a:r>
             <a:r>
               <a:rPr lang="en-US" kern="0" dirty="0" err="1"/>
@@ -8938,7 +9157,7 @@
         </p:nvSpPr>
         <p:spPr>
           <a:xfrm>
-            <a:off x="2780102" y="1134102"/>
+            <a:off x="2366629" y="1134023"/>
             <a:ext cx="2066500" cy="246221"/>
           </a:xfrm>
           <a:prstGeom prst="rect">
@@ -8960,12 +9179,13 @@
             </a:lvl1pPr>
           </a:lstStyle>
           <a:p>
+            <a:pPr algn="ctr"/>
             <a:r>
               <a:rPr lang="en-US" dirty="0">
                 <a:latin typeface="Arial" panose="020B0604020202020204" pitchFamily="34" charset="0"/>
                 <a:cs typeface="Arial" panose="020B0604020202020204" pitchFamily="34" charset="0"/>
               </a:rPr>
-              <a:t>User web browser HMI</a:t>
+              <a:t>User interface</a:t>
             </a:r>
           </a:p>
         </p:txBody>
@@ -9238,7 +9458,7 @@
         <p:spPr>
           <a:xfrm>
             <a:off x="7414295" y="3820510"/>
-            <a:ext cx="1568121" cy="646331"/>
+            <a:ext cx="1568121" cy="507831"/>
           </a:xfrm>
           <a:prstGeom prst="rect">
             <a:avLst/>
@@ -9274,19 +9494,7 @@
                 <a:latin typeface="Arial" panose="020B0604020202020204" pitchFamily="34" charset="0"/>
                 <a:cs typeface="Arial" panose="020B0604020202020204" pitchFamily="34" charset="0"/>
               </a:rPr>
-              <a:t>Specific microservices or tools through API </a:t>
-            </a:r>
-          </a:p>
-          <a:p>
-            <a:r>
-              <a:rPr lang="en-US" sz="900" b="0" dirty="0">
-                <a:solidFill>
-                  <a:schemeClr val="tx1"/>
-                </a:solidFill>
-                <a:latin typeface="Arial" panose="020B0604020202020204" pitchFamily="34" charset="0"/>
-                <a:cs typeface="Arial" panose="020B0604020202020204" pitchFamily="34" charset="0"/>
-              </a:rPr>
-              <a:t>(e.g. multiple vendor IED Configuration tools)</a:t>
+              <a:t>Specific microservices or API (e.g. vendor-specific IED Configuration tools)</a:t>
             </a:r>
           </a:p>
         </p:txBody>
@@ -10371,7 +10579,15 @@
             </a:r>
             <a:r>
               <a:rPr lang="en-US" kern="0" dirty="0"/>
-              <a:t>, GE, National Grid, RTE, Schneider Electric, </a:t>
+              <a:t>, GE, National Grid, </a:t>
+            </a:r>
+            <a:r>
+              <a:rPr lang="en-US" kern="0" dirty="0" err="1"/>
+              <a:t>OSIsoft</a:t>
+            </a:r>
+            <a:r>
+              <a:rPr lang="en-US" kern="0" dirty="0"/>
+              <a:t>, RTE, Schneider Electric, </a:t>
             </a:r>
             <a:r>
               <a:rPr lang="en-US" kern="0" dirty="0" err="1"/>
@@ -11803,7 +12019,15 @@
             </a:r>
             <a:r>
               <a:rPr lang="en-US" kern="0" dirty="0"/>
-              <a:t>, GE, National Grid, RTE, Schneider Electric, </a:t>
+              <a:t>, GE, National Grid, </a:t>
+            </a:r>
+            <a:r>
+              <a:rPr lang="en-US" kern="0" dirty="0" err="1"/>
+              <a:t>OSIsoft</a:t>
+            </a:r>
+            <a:r>
+              <a:rPr lang="en-US" kern="0" dirty="0"/>
+              <a:t>, RTE, Schneider Electric, </a:t>
             </a:r>
             <a:r>
               <a:rPr lang="en-US" kern="0" dirty="0" err="1"/>
@@ -13128,7 +13352,15 @@
             </a:r>
             <a:r>
               <a:rPr lang="en-US" kern="0" dirty="0"/>
-              <a:t>, GE, National Grid, RTE, Schneider Electric, </a:t>
+              <a:t>, GE, National Grid, </a:t>
+            </a:r>
+            <a:r>
+              <a:rPr lang="en-US" kern="0" dirty="0" err="1"/>
+              <a:t>OSIsoft</a:t>
+            </a:r>
+            <a:r>
+              <a:rPr lang="en-US" kern="0" dirty="0"/>
+              <a:t>, RTE, Schneider Electric, </a:t>
             </a:r>
             <a:r>
               <a:rPr lang="en-US" kern="0" dirty="0" err="1"/>
@@ -14090,7 +14322,15 @@
             </a:r>
             <a:r>
               <a:rPr lang="en-US" kern="0" dirty="0"/>
-              <a:t>, GE, National Grid, RTE, Schneider Electric, </a:t>
+              <a:t>, GE, National Grid, </a:t>
+            </a:r>
+            <a:r>
+              <a:rPr lang="en-US" kern="0" dirty="0" err="1"/>
+              <a:t>OSIsoft</a:t>
+            </a:r>
+            <a:r>
+              <a:rPr lang="en-US" kern="0" dirty="0"/>
+              <a:t>, RTE, Schneider Electric, </a:t>
             </a:r>
             <a:r>
               <a:rPr lang="en-US" kern="0" dirty="0" err="1"/>
@@ -14365,7 +14605,15 @@
             </a:r>
             <a:r>
               <a:rPr lang="en-US" kern="0" dirty="0"/>
-              <a:t>, GE, National Grid, RTE, Schneider Electric, </a:t>
+              <a:t>, GE, National Grid, </a:t>
+            </a:r>
+            <a:r>
+              <a:rPr lang="en-US" kern="0" dirty="0" err="1"/>
+              <a:t>OSIsoft</a:t>
+            </a:r>
+            <a:r>
+              <a:rPr lang="en-US" kern="0" dirty="0"/>
+              <a:t>, RTE, Schneider Electric, </a:t>
             </a:r>
             <a:r>
               <a:rPr lang="en-US" kern="0" dirty="0" err="1"/>
@@ -14678,7 +14926,15 @@
             </a:r>
             <a:r>
               <a:rPr lang="en-US" kern="0" dirty="0"/>
-              <a:t>, GE, National Grid, RTE, Schneider Electric, </a:t>
+              <a:t>, GE, National Grid, </a:t>
+            </a:r>
+            <a:r>
+              <a:rPr lang="en-US" kern="0" dirty="0" err="1"/>
+              <a:t>OSIsoft</a:t>
+            </a:r>
+            <a:r>
+              <a:rPr lang="en-US" kern="0" dirty="0"/>
+              <a:t>, RTE, Schneider Electric, </a:t>
             </a:r>
             <a:r>
               <a:rPr lang="en-US" kern="0" dirty="0" err="1"/>
@@ -14948,7 +15204,15 @@
             </a:r>
             <a:r>
               <a:rPr lang="en-US" kern="0" dirty="0"/>
-              <a:t>, GE, National Grid, RTE, Schneider Electric, </a:t>
+              <a:t>, GE, National Grid, </a:t>
+            </a:r>
+            <a:r>
+              <a:rPr lang="en-US" kern="0" dirty="0" err="1"/>
+              <a:t>OSIsoft</a:t>
+            </a:r>
+            <a:r>
+              <a:rPr lang="en-US" kern="0" dirty="0"/>
+              <a:t>, RTE, Schneider Electric, </a:t>
             </a:r>
             <a:r>
               <a:rPr lang="en-US" kern="0" dirty="0" err="1"/>
@@ -15275,7 +15539,15 @@
             </a:r>
             <a:r>
               <a:rPr lang="en-US" kern="0" dirty="0"/>
-              <a:t>, GE, National Grid, RTE, Schneider Electric, </a:t>
+              <a:t>, GE, National Grid, </a:t>
+            </a:r>
+            <a:r>
+              <a:rPr lang="en-US" kern="0" dirty="0" err="1"/>
+              <a:t>OSIsoft</a:t>
+            </a:r>
+            <a:r>
+              <a:rPr lang="en-US" kern="0" dirty="0"/>
+              <a:t>, RTE, Schneider Electric, </a:t>
             </a:r>
             <a:r>
               <a:rPr lang="en-US" kern="0" dirty="0" err="1"/>
@@ -15545,7 +15817,15 @@
             </a:r>
             <a:r>
               <a:rPr lang="en-US" kern="0" dirty="0"/>
-              <a:t>, GE, National Grid, RTE, Schneider Electric, </a:t>
+              <a:t>, GE, National Grid, </a:t>
+            </a:r>
+            <a:r>
+              <a:rPr lang="en-US" kern="0" dirty="0" err="1"/>
+              <a:t>OSIsoft</a:t>
+            </a:r>
+            <a:r>
+              <a:rPr lang="en-US" kern="0" dirty="0"/>
+              <a:t>, RTE, Schneider Electric, </a:t>
             </a:r>
             <a:r>
               <a:rPr lang="en-US" kern="0" dirty="0" err="1"/>
@@ -15677,7 +15957,15 @@
             </a:r>
             <a:r>
               <a:rPr lang="en-US" kern="0" dirty="0"/>
-              <a:t>, GE, National Grid, RTE, Schneider Electric, </a:t>
+              <a:t>, GE, National Grid, </a:t>
+            </a:r>
+            <a:r>
+              <a:rPr lang="en-US" kern="0" dirty="0" err="1"/>
+              <a:t>OSIsoft</a:t>
+            </a:r>
+            <a:r>
+              <a:rPr lang="en-US" kern="0" dirty="0"/>
+              <a:t>, RTE, Schneider Electric, </a:t>
             </a:r>
             <a:r>
               <a:rPr lang="en-US" kern="0" dirty="0" err="1"/>
@@ -16309,6 +16597,21 @@
 </file>
 
 <file path=customXml/item1.xml><?xml version="1.0" encoding="utf-8"?>
+<?mso-contentType ?>
+<FormTemplates xmlns="http://schemas.microsoft.com/sharepoint/v3/contenttype/forms">
+  <Display>DocumentLibraryForm</Display>
+  <Edit>DocumentLibraryForm</Edit>
+  <New>DocumentLibraryForm</New>
+</FormTemplates>
+</file>
+
+<file path=customXml/item2.xml><?xml version="1.0" encoding="utf-8"?>
+<p:properties xmlns:p="http://schemas.microsoft.com/office/2006/metadata/properties" xmlns:xsi="http://www.w3.org/2001/XMLSchema-instance" xmlns:pc="http://schemas.microsoft.com/office/infopath/2007/PartnerControls">
+  <documentManagement/>
+</p:properties>
+</file>
+
+<file path=customXml/item3.xml><?xml version="1.0" encoding="utf-8"?>
 <ct:contentTypeSchema xmlns:ct="http://schemas.microsoft.com/office/2006/metadata/contentType" xmlns:ma="http://schemas.microsoft.com/office/2006/metadata/properties/metaAttributes" ct:_="" ma:_="" ma:contentTypeName="Document" ma:contentTypeID="0x010100B8E3E32BF4729743B02F4C8693FB7908" ma:contentTypeVersion="12" ma:contentTypeDescription="Create a new document." ma:contentTypeScope="" ma:versionID="3e0f492865cb3c751c643fce921cc8fa">
   <xsd:schema xmlns:xsd="http://www.w3.org/2001/XMLSchema" xmlns:xs="http://www.w3.org/2001/XMLSchema" xmlns:p="http://schemas.microsoft.com/office/2006/metadata/properties" xmlns:ns3="e7eebcba-988e-498c-899d-a3b4259f0312" xmlns:ns4="093020be-362e-427e-bcba-5bfc522db69b" targetNamespace="http://schemas.microsoft.com/office/2006/metadata/properties" ma:root="true" ma:fieldsID="5bbabbdba72354330c02a7c54b2a7020" ns3:_="" ns4:_="">
     <xsd:import namespace="e7eebcba-988e-498c-899d-a3b4259f0312"/>
@@ -16525,22 +16828,32 @@
 </ct:contentTypeSchema>
 </file>
 
-<file path=customXml/item2.xml><?xml version="1.0" encoding="utf-8"?>
-<p:properties xmlns:p="http://schemas.microsoft.com/office/2006/metadata/properties" xmlns:xsi="http://www.w3.org/2001/XMLSchema-instance" xmlns:pc="http://schemas.microsoft.com/office/infopath/2007/PartnerControls">
-  <documentManagement/>
-</p:properties>
+<file path=customXml/itemProps1.xml><?xml version="1.0" encoding="utf-8"?>
+<ds:datastoreItem xmlns:ds="http://schemas.openxmlformats.org/officeDocument/2006/customXml" ds:itemID="{07DB450A-8D36-4862-84CA-6677EABDCA54}">
+  <ds:schemaRefs>
+    <ds:schemaRef ds:uri="http://schemas.microsoft.com/sharepoint/v3/contenttype/forms"/>
+  </ds:schemaRefs>
+</ds:datastoreItem>
 </file>
 
-<file path=customXml/item3.xml><?xml version="1.0" encoding="utf-8"?>
-<?mso-contentType ?>
-<FormTemplates xmlns="http://schemas.microsoft.com/sharepoint/v3/contenttype/forms">
-  <Display>DocumentLibraryForm</Display>
-  <Edit>DocumentLibraryForm</Edit>
-  <New>DocumentLibraryForm</New>
-</FormTemplates>
+<file path=customXml/itemProps2.xml><?xml version="1.0" encoding="utf-8"?>
+<ds:datastoreItem xmlns:ds="http://schemas.openxmlformats.org/officeDocument/2006/customXml" ds:itemID="{FA141814-2E17-43BE-825B-E6FF967D2C19}">
+  <ds:schemaRefs>
+    <ds:schemaRef ds:uri="http://schemas.microsoft.com/office/2006/documentManagement/types"/>
+    <ds:schemaRef ds:uri="http://purl.org/dc/elements/1.1/"/>
+    <ds:schemaRef ds:uri="http://schemas.microsoft.com/office/2006/metadata/properties"/>
+    <ds:schemaRef ds:uri="http://purl.org/dc/terms/"/>
+    <ds:schemaRef ds:uri="http://purl.org/dc/dcmitype/"/>
+    <ds:schemaRef ds:uri="http://schemas.microsoft.com/office/infopath/2007/PartnerControls"/>
+    <ds:schemaRef ds:uri="http://schemas.openxmlformats.org/package/2006/metadata/core-properties"/>
+    <ds:schemaRef ds:uri="093020be-362e-427e-bcba-5bfc522db69b"/>
+    <ds:schemaRef ds:uri="e7eebcba-988e-498c-899d-a3b4259f0312"/>
+    <ds:schemaRef ds:uri="http://www.w3.org/XML/1998/namespace"/>
+  </ds:schemaRefs>
+</ds:datastoreItem>
 </file>
 
-<file path=customXml/itemProps1.xml><?xml version="1.0" encoding="utf-8"?>
+<file path=customXml/itemProps3.xml><?xml version="1.0" encoding="utf-8"?>
 <ds:datastoreItem xmlns:ds="http://schemas.openxmlformats.org/officeDocument/2006/customXml" ds:itemID="{3FDB9C31-C157-47E7-9FA8-12E1E6E9E8A5}">
   <ds:schemaRefs>
     <ds:schemaRef ds:uri="http://schemas.microsoft.com/office/2006/metadata/contentType"/>
@@ -16557,29 +16870,4 @@
     <ds:schemaRef ds:uri="http://schemas.microsoft.com/internal/obd"/>
   </ds:schemaRefs>
 </ds:datastoreItem>
-</file>
-
-<file path=customXml/itemProps2.xml><?xml version="1.0" encoding="utf-8"?>
-<ds:datastoreItem xmlns:ds="http://schemas.openxmlformats.org/officeDocument/2006/customXml" ds:itemID="{FA141814-2E17-43BE-825B-E6FF967D2C19}">
-  <ds:schemaRefs>
-    <ds:schemaRef ds:uri="http://purl.org/dc/elements/1.1/"/>
-    <ds:schemaRef ds:uri="http://purl.org/dc/terms/"/>
-    <ds:schemaRef ds:uri="http://schemas.microsoft.com/office/2006/metadata/properties"/>
-    <ds:schemaRef ds:uri="http://schemas.microsoft.com/office/infopath/2007/PartnerControls"/>
-    <ds:schemaRef ds:uri="http://schemas.microsoft.com/office/2006/documentManagement/types"/>
-    <ds:schemaRef ds:uri="http://www.w3.org/XML/1998/namespace"/>
-    <ds:schemaRef ds:uri="http://schemas.openxmlformats.org/package/2006/metadata/core-properties"/>
-    <ds:schemaRef ds:uri="e7eebcba-988e-498c-899d-a3b4259f0312"/>
-    <ds:schemaRef ds:uri="093020be-362e-427e-bcba-5bfc522db69b"/>
-    <ds:schemaRef ds:uri="http://purl.org/dc/dcmitype/"/>
-  </ds:schemaRefs>
-</ds:datastoreItem>
-</file>
-
-<file path=customXml/itemProps3.xml><?xml version="1.0" encoding="utf-8"?>
-<ds:datastoreItem xmlns:ds="http://schemas.openxmlformats.org/officeDocument/2006/customXml" ds:itemID="{07DB450A-8D36-4862-84CA-6677EABDCA54}">
-  <ds:schemaRefs>
-    <ds:schemaRef ds:uri="http://schemas.microsoft.com/sharepoint/v3/contenttype/forms"/>
-  </ds:schemaRefs>
-</ds:datastoreItem>
 </file>
</xml_diff>